<commit_message>
updating template for 2014
</commit_message>
<xml_diff>
--- a/LectureFiles/cshl/2015/CSHL_Powerpoint_Template_2015.pptx
+++ b/LectureFiles/cshl/2015/CSHL_Powerpoint_Template_2015.pptx
@@ -248,7 +248,7 @@
               <a:pPr>
                 <a:defRPr/>
               </a:pPr>
-              <a:t>11/15/14</a:t>
+              <a:t>11/12/15</a:t>
             </a:fld>
             <a:endParaRPr lang="en-US"/>
           </a:p>
@@ -455,7 +455,7 @@
               <a:pPr>
                 <a:defRPr/>
               </a:pPr>
-              <a:t>11/15/14</a:t>
+              <a:t>11/12/15</a:t>
             </a:fld>
             <a:endParaRPr lang="en-US"/>
           </a:p>
@@ -3091,7 +3091,7 @@
               <a:pPr>
                 <a:defRPr/>
               </a:pPr>
-              <a:t>11/15/14</a:t>
+              <a:t>11/12/15</a:t>
             </a:fld>
             <a:endParaRPr lang="en-US"/>
           </a:p>
@@ -4161,17 +4161,57 @@
           <a:p>
             <a:pPr algn="r" eaLnBrk="1" hangingPunct="1"/>
             <a:r>
-              <a:rPr lang="en-US" sz="2000">
+              <a:rPr lang="en-US" sz="2000" dirty="0" smtClean="0">
                 <a:solidFill>
                   <a:schemeClr val="bg1"/>
                 </a:solidFill>
                 <a:latin typeface="Calibri" charset="0"/>
                 <a:cs typeface="Segoe UI" charset="0"/>
               </a:rPr>
-              <a:t>Module 1</a:t>
+              <a:t>RNA-</a:t>
+            </a:r>
+            <a:r>
+              <a:rPr lang="en-US" sz="2000" dirty="0" err="1">
+                <a:solidFill>
+                  <a:schemeClr val="bg1"/>
+                </a:solidFill>
+                <a:latin typeface="Calibri" charset="0"/>
+                <a:cs typeface="Segoe UI" charset="0"/>
+              </a:rPr>
+              <a:t>S</a:t>
+            </a:r>
+            <a:r>
+              <a:rPr lang="en-US" sz="2000" dirty="0" err="1" smtClean="0">
+                <a:solidFill>
+                  <a:schemeClr val="bg1"/>
+                </a:solidFill>
+                <a:latin typeface="Calibri" charset="0"/>
+                <a:cs typeface="Segoe UI" charset="0"/>
+              </a:rPr>
+              <a:t>eq</a:t>
+            </a:r>
+            <a:r>
+              <a:rPr lang="en-US" sz="2000" dirty="0" smtClean="0">
+                <a:solidFill>
+                  <a:schemeClr val="bg1"/>
+                </a:solidFill>
+                <a:latin typeface="Calibri" charset="0"/>
+                <a:cs typeface="Segoe UI" charset="0"/>
+              </a:rPr>
+              <a:t> Module </a:t>
+            </a:r>
+            <a:r>
+              <a:rPr lang="en-US" sz="2000" dirty="0">
+                <a:solidFill>
+                  <a:schemeClr val="bg1"/>
+                </a:solidFill>
+                <a:latin typeface="Calibri" charset="0"/>
+                <a:cs typeface="Segoe UI" charset="0"/>
+              </a:rPr>
+              <a:t>1</a:t>
             </a:r>
             <a:br>
-              <a:rPr lang="en-US" sz="2000">
+              <a:rPr lang="en-US" sz="2000" dirty="0">
                 <a:solidFill>
                   <a:schemeClr val="bg1"/>
                 </a:solidFill>
@@ -4180,7 +4220,7 @@
               </a:rPr>
             </a:br>
             <a:r>
-              <a:rPr lang="en-US" sz="2000">
+              <a:rPr lang="en-US" sz="2000" dirty="0">
                 <a:solidFill>
                   <a:schemeClr val="bg1"/>
                 </a:solidFill>
@@ -4189,7 +4229,7 @@
               </a:rPr>
               <a:t>Introduction to RNA sequencing (lecture)</a:t>
             </a:r>
-            <a:endParaRPr lang="en-US" sz="1800" b="1">
+            <a:endParaRPr lang="en-US" sz="1800" b="1" dirty="0">
               <a:solidFill>
                 <a:schemeClr val="bg1"/>
               </a:solidFill>
@@ -4241,15 +4281,15 @@
                 <a:ea typeface="+mj-ea"/>
                 <a:cs typeface="Calibri"/>
               </a:rPr>
-              <a:t>Malachi Griffith, Obi Griffith, Jason Walker, Ben </a:t>
-            </a:r>
-            <a:r>
-              <a:rPr lang="en-US" sz="1600" dirty="0" err="1" smtClean="0">
+              <a:t>Malachi Griffith, Obi Griffith, Jason </a:t>
+            </a:r>
+            <a:r>
+              <a:rPr lang="en-US" sz="1600" dirty="0" smtClean="0">
                 <a:latin typeface="Calibri"/>
                 <a:ea typeface="+mj-ea"/>
                 <a:cs typeface="Calibri"/>
               </a:rPr>
-              <a:t>Ainscough</a:t>
+              <a:t>Walker</a:t>
             </a:r>
             <a:endParaRPr lang="en-US" sz="1600" dirty="0" smtClean="0">
               <a:latin typeface="Calibri"/>
@@ -4289,7 +4329,7 @@
               <a:defRPr/>
             </a:pPr>
             <a:r>
-              <a:rPr lang="en-US" sz="1400" dirty="0" smtClean="0">
+              <a:rPr lang="en-US" sz="1400" dirty="0">
                 <a:ln w="1270">
                   <a:solidFill>
                     <a:schemeClr val="tx1">
@@ -4301,8 +4341,20 @@
                 <a:ea typeface="+mn-ea"/>
                 <a:cs typeface="Calibri"/>
               </a:rPr>
-              <a:t>November 11-23, 2014</a:t>
-            </a:r>
+              <a:t>November 10 - 22, 2015</a:t>
+            </a:r>
+            <a:endParaRPr lang="en-US" sz="1400" dirty="0" smtClean="0">
+              <a:ln w="1270">
+                <a:solidFill>
+                  <a:schemeClr val="tx1">
+                    <a:alpha val="38000"/>
+                  </a:schemeClr>
+                </a:solidFill>
+              </a:ln>
+              <a:latin typeface="Calibri"/>
+              <a:ea typeface="+mn-ea"/>
+              <a:cs typeface="Calibri"/>
+            </a:endParaRPr>
           </a:p>
         </p:txBody>
       </p:sp>

</xml_diff>